<commit_message>
Laura poster final version
</commit_message>
<xml_diff>
--- a/seminar/poster Laura/Poster_Laura.pptx
+++ b/seminar/poster Laura/Poster_Laura.pptx
@@ -508,536 +508,6 @@
           <a:bodyPr/>
           <a:lstStyle/>
           <a:p>
-            <a:r>
-              <a:rPr lang="de-DE" dirty="0"/>
-              <a:t>Table 1 </a:t>
-            </a:r>
-            <a:r>
-              <a:rPr lang="de-DE" dirty="0" err="1"/>
-              <a:t>mean</a:t>
-            </a:r>
-            <a:r>
-              <a:rPr lang="de-DE" dirty="0"/>
-              <a:t> per </a:t>
-            </a:r>
-            <a:r>
-              <a:rPr lang="de-DE" dirty="0" err="1"/>
-              <a:t>episode</a:t>
-            </a:r>
-            <a:r>
-              <a:rPr lang="de-DE" dirty="0"/>
-              <a:t> - </a:t>
-            </a:r>
-            <a:r>
-              <a:rPr lang="de-DE" dirty="0" err="1"/>
-              <a:t>done</a:t>
-            </a:r>
-            <a:endParaRPr lang="de-DE" dirty="0"/>
-          </a:p>
-          <a:p>
-            <a:r>
-              <a:rPr lang="de-DE" dirty="0"/>
-              <a:t>Table 2 </a:t>
-            </a:r>
-            <a:r>
-              <a:rPr lang="de-DE" dirty="0" err="1"/>
-              <a:t>bild</a:t>
-            </a:r>
-            <a:r>
-              <a:rPr lang="de-DE" dirty="0"/>
-              <a:t> und top  5 </a:t>
-            </a:r>
-            <a:r>
-              <a:rPr lang="de-DE" dirty="0" err="1"/>
-              <a:t>betweeness</a:t>
-            </a:r>
-            <a:r>
-              <a:rPr lang="de-DE" dirty="0"/>
-              <a:t> pro </a:t>
-            </a:r>
-            <a:r>
-              <a:rPr lang="de-DE" dirty="0" err="1"/>
-              <a:t>episode</a:t>
-            </a:r>
-            <a:r>
-              <a:rPr lang="de-DE" dirty="0"/>
-              <a:t> - </a:t>
-            </a:r>
-            <a:r>
-              <a:rPr lang="de-DE" dirty="0" err="1"/>
-              <a:t>done</a:t>
-            </a:r>
-            <a:endParaRPr lang="de-DE" dirty="0"/>
-          </a:p>
-          <a:p>
-            <a:r>
-              <a:rPr lang="de-DE" dirty="0" err="1"/>
-              <a:t>Anova</a:t>
-            </a:r>
-            <a:r>
-              <a:rPr lang="de-DE" dirty="0"/>
-              <a:t> </a:t>
-            </a:r>
-            <a:r>
-              <a:rPr lang="de-DE" dirty="0" err="1"/>
-              <a:t>bedinunen</a:t>
-            </a:r>
-            <a:r>
-              <a:rPr lang="de-DE" dirty="0"/>
-              <a:t> balkendiaramm (f werte, </a:t>
-            </a:r>
-            <a:r>
-              <a:rPr lang="de-DE" dirty="0" err="1"/>
-              <a:t>freieitsrade</a:t>
-            </a:r>
-            <a:r>
-              <a:rPr lang="de-DE" dirty="0"/>
-              <a:t>, p-wert, </a:t>
-            </a:r>
-            <a:r>
-              <a:rPr lang="en-US" dirty="0">
-                <a:effectLst/>
-              </a:rPr>
-              <a:t>Sum Sq, Mean Sq, eta square</a:t>
-            </a:r>
-            <a:r>
-              <a:rPr lang="de-DE" dirty="0"/>
-              <a:t>) - </a:t>
-            </a:r>
-            <a:r>
-              <a:rPr lang="de-DE" dirty="0" err="1"/>
-              <a:t>done</a:t>
-            </a:r>
-            <a:endParaRPr lang="de-DE" dirty="0"/>
-          </a:p>
-          <a:p>
-            <a:r>
-              <a:rPr lang="de-DE" dirty="0" err="1"/>
-              <a:t>Anova</a:t>
-            </a:r>
-            <a:r>
-              <a:rPr lang="de-DE" dirty="0"/>
-              <a:t> </a:t>
-            </a:r>
-            <a:r>
-              <a:rPr lang="de-DE" dirty="0" err="1"/>
-              <a:t>zalen</a:t>
-            </a:r>
-            <a:r>
-              <a:rPr lang="de-DE" dirty="0"/>
-              <a:t> als </a:t>
-            </a:r>
-            <a:r>
-              <a:rPr lang="de-DE" dirty="0" err="1"/>
-              <a:t>bild</a:t>
-            </a:r>
-            <a:r>
-              <a:rPr lang="de-DE" dirty="0"/>
-              <a:t> in - </a:t>
-            </a:r>
-            <a:r>
-              <a:rPr lang="de-DE" dirty="0" err="1"/>
-              <a:t>done</a:t>
-            </a:r>
-            <a:endParaRPr lang="de-DE" dirty="0"/>
-          </a:p>
-          <a:p>
-            <a:r>
-              <a:rPr lang="de-DE" dirty="0" err="1"/>
-              <a:t>Rp</a:t>
-            </a:r>
-            <a:r>
-              <a:rPr lang="de-DE" dirty="0"/>
-              <a:t> werte deuten </a:t>
-            </a:r>
-            <a:r>
-              <a:rPr lang="de-DE" dirty="0" err="1"/>
-              <a:t>assorziativitaet</a:t>
-            </a:r>
-            <a:r>
-              <a:rPr lang="de-DE" dirty="0"/>
-              <a:t> </a:t>
-            </a:r>
-            <a:r>
-              <a:rPr lang="de-DE" dirty="0" err="1"/>
-              <a:t>inzufueen</a:t>
-            </a:r>
-            <a:r>
-              <a:rPr lang="de-DE" dirty="0"/>
-              <a:t>  - </a:t>
-            </a:r>
-            <a:r>
-              <a:rPr lang="de-DE" dirty="0" err="1"/>
-              <a:t>done</a:t>
-            </a:r>
-            <a:endParaRPr lang="de-DE" dirty="0"/>
-          </a:p>
-          <a:p>
-            <a:r>
-              <a:rPr lang="de-DE" dirty="0" err="1"/>
-              <a:t>Felerbalken</a:t>
-            </a:r>
-            <a:r>
-              <a:rPr lang="de-DE" dirty="0"/>
-              <a:t> </a:t>
-            </a:r>
-            <a:r>
-              <a:rPr lang="de-DE" dirty="0" err="1"/>
-              <a:t>anova</a:t>
-            </a:r>
-            <a:r>
-              <a:rPr lang="de-DE" dirty="0"/>
-              <a:t> balkendiaramm = </a:t>
-            </a:r>
-            <a:r>
-              <a:rPr lang="de-DE" dirty="0" err="1"/>
-              <a:t>valence</a:t>
-            </a:r>
-            <a:r>
-              <a:rPr lang="de-DE" dirty="0"/>
-              <a:t> </a:t>
-            </a:r>
-            <a:r>
-              <a:rPr lang="de-DE" dirty="0" err="1"/>
-              <a:t>sentiment</a:t>
-            </a:r>
-            <a:r>
-              <a:rPr lang="de-DE" dirty="0"/>
-              <a:t> wert – </a:t>
-            </a:r>
-            <a:r>
-              <a:rPr lang="de-DE" dirty="0" err="1"/>
-              <a:t>done</a:t>
-            </a:r>
-            <a:endParaRPr lang="de-DE" dirty="0"/>
-          </a:p>
-          <a:p>
-            <a:pPr>
-              <a:spcAft>
-                <a:spcPts val="3600"/>
-              </a:spcAft>
-            </a:pPr>
-            <a:r>
-              <a:rPr lang="en-GB" sz="1600" dirty="0">
-                <a:solidFill>
-                  <a:srgbClr val="004481"/>
-                </a:solidFill>
-                <a:latin typeface="Segoe UI Light" panose="020B0502040204020203" pitchFamily="34" charset="0"/>
-              </a:rPr>
-              <a:t>Results / Conclusion</a:t>
-            </a:r>
-          </a:p>
-          <a:p>
-            <a:pPr>
-              <a:spcAft>
-                <a:spcPts val="3600"/>
-              </a:spcAft>
-            </a:pPr>
-            <a:r>
-              <a:rPr lang="en-US" sz="1200" dirty="0">
-                <a:solidFill>
-                  <a:srgbClr val="FF0000"/>
-                </a:solidFill>
-                <a:latin typeface="Franklin Gothic Book" panose="020B0503020102020204" pitchFamily="34" charset="0"/>
-              </a:rPr>
-              <a:t>Edge Density </a:t>
-            </a:r>
-            <a:r>
-              <a:rPr lang="en-US" sz="1200" dirty="0" err="1">
-                <a:solidFill>
-                  <a:srgbClr val="FF0000"/>
-                </a:solidFill>
-                <a:latin typeface="Franklin Gothic Book" panose="020B0503020102020204" pitchFamily="34" charset="0"/>
-              </a:rPr>
-              <a:t>sinnvoll</a:t>
-            </a:r>
-            <a:r>
-              <a:rPr lang="en-US" sz="1200" dirty="0">
-                <a:solidFill>
-                  <a:srgbClr val="FF0000"/>
-                </a:solidFill>
-                <a:latin typeface="Franklin Gothic Book" panose="020B0503020102020204" pitchFamily="34" charset="0"/>
-              </a:rPr>
-              <a:t> </a:t>
-            </a:r>
-            <a:r>
-              <a:rPr lang="en-US" sz="1200" dirty="0" err="1">
-                <a:solidFill>
-                  <a:srgbClr val="FF0000"/>
-                </a:solidFill>
-                <a:latin typeface="Franklin Gothic Book" panose="020B0503020102020204" pitchFamily="34" charset="0"/>
-              </a:rPr>
-              <a:t>ueber</a:t>
-            </a:r>
-            <a:r>
-              <a:rPr lang="en-US" sz="1200" dirty="0">
-                <a:solidFill>
-                  <a:srgbClr val="FF0000"/>
-                </a:solidFill>
-                <a:latin typeface="Franklin Gothic Book" panose="020B0503020102020204" pitchFamily="34" charset="0"/>
-              </a:rPr>
-              <a:t> </a:t>
-            </a:r>
-            <a:r>
-              <a:rPr lang="en-US" sz="1200" dirty="0" err="1">
-                <a:solidFill>
-                  <a:srgbClr val="FF0000"/>
-                </a:solidFill>
-                <a:latin typeface="Franklin Gothic Book" panose="020B0503020102020204" pitchFamily="34" charset="0"/>
-              </a:rPr>
-              <a:t>ganze</a:t>
-            </a:r>
-            <a:r>
-              <a:rPr lang="en-US" sz="1200" dirty="0">
-                <a:solidFill>
-                  <a:srgbClr val="FF0000"/>
-                </a:solidFill>
-                <a:latin typeface="Franklin Gothic Book" panose="020B0503020102020204" pitchFamily="34" charset="0"/>
-              </a:rPr>
-              <a:t> Serie, </a:t>
-            </a:r>
-            <a:r>
-              <a:rPr lang="en-US" sz="1200" dirty="0" err="1">
-                <a:solidFill>
-                  <a:srgbClr val="FF0000"/>
-                </a:solidFill>
-                <a:latin typeface="Franklin Gothic Book" panose="020B0503020102020204" pitchFamily="34" charset="0"/>
-              </a:rPr>
-              <a:t>oder</a:t>
-            </a:r>
-            <a:r>
-              <a:rPr lang="en-US" sz="1200" dirty="0">
-                <a:solidFill>
-                  <a:srgbClr val="FF0000"/>
-                </a:solidFill>
-                <a:latin typeface="Franklin Gothic Book" panose="020B0503020102020204" pitchFamily="34" charset="0"/>
-              </a:rPr>
-              <a:t> </a:t>
-            </a:r>
-            <a:r>
-              <a:rPr lang="en-US" sz="1200" dirty="0" err="1">
-                <a:solidFill>
-                  <a:srgbClr val="FF0000"/>
-                </a:solidFill>
-                <a:latin typeface="Franklin Gothic Book" panose="020B0503020102020204" pitchFamily="34" charset="0"/>
-              </a:rPr>
-              <a:t>besser</a:t>
-            </a:r>
-            <a:r>
-              <a:rPr lang="en-US" sz="1200" dirty="0">
-                <a:solidFill>
-                  <a:srgbClr val="FF0000"/>
-                </a:solidFill>
-                <a:latin typeface="Franklin Gothic Book" panose="020B0503020102020204" pitchFamily="34" charset="0"/>
-              </a:rPr>
-              <a:t> pro </a:t>
-            </a:r>
-            <a:r>
-              <a:rPr lang="en-US" sz="1200" dirty="0" err="1">
-                <a:solidFill>
-                  <a:srgbClr val="FF0000"/>
-                </a:solidFill>
-                <a:latin typeface="Franklin Gothic Book" panose="020B0503020102020204" pitchFamily="34" charset="0"/>
-              </a:rPr>
-              <a:t>Folge</a:t>
-            </a:r>
-            <a:r>
-              <a:rPr lang="en-US" sz="1200" dirty="0">
-                <a:solidFill>
-                  <a:srgbClr val="FF0000"/>
-                </a:solidFill>
-                <a:latin typeface="Franklin Gothic Book" panose="020B0503020102020204" pitchFamily="34" charset="0"/>
-              </a:rPr>
-              <a:t> </a:t>
-            </a:r>
-            <a:r>
-              <a:rPr lang="en-US" sz="1200" dirty="0" err="1">
-                <a:solidFill>
-                  <a:srgbClr val="FF0000"/>
-                </a:solidFill>
-                <a:latin typeface="Franklin Gothic Book" panose="020B0503020102020204" pitchFamily="34" charset="0"/>
-              </a:rPr>
-              <a:t>dann</a:t>
-            </a:r>
-            <a:r>
-              <a:rPr lang="en-US" sz="1200" dirty="0">
-                <a:solidFill>
-                  <a:srgbClr val="FF0000"/>
-                </a:solidFill>
-                <a:latin typeface="Franklin Gothic Book" panose="020B0503020102020204" pitchFamily="34" charset="0"/>
-              </a:rPr>
-              <a:t> mean?</a:t>
-            </a:r>
-          </a:p>
-          <a:p>
-            <a:pPr>
-              <a:spcAft>
-                <a:spcPts val="3600"/>
-              </a:spcAft>
-            </a:pPr>
-            <a:r>
-              <a:rPr lang="en-US" sz="1200" dirty="0">
-                <a:latin typeface="Franklin Gothic Book" panose="020B0503020102020204" pitchFamily="34" charset="0"/>
-              </a:rPr>
-              <a:t>Through the creation of the graphs, it was possible to identify some characteristics of the social structure within the series. Table 1 shows selected properties of the graph over the complete series, Table 3 shows properties that can be calculated per node, in this case concerning the main character Marinette. </a:t>
-            </a:r>
-          </a:p>
-          <a:p>
-            <a:pPr>
-              <a:spcAft>
-                <a:spcPts val="3600"/>
-              </a:spcAft>
-            </a:pPr>
-            <a:r>
-              <a:rPr lang="en-US" sz="1200" dirty="0">
-                <a:latin typeface="Franklin Gothic Book" panose="020B0503020102020204" pitchFamily="34" charset="0"/>
-              </a:rPr>
-              <a:t>Figure 2 shows the sentiment between the roles. Main character are showing significant more stress when talking to villains as villains when they talking to main. Friends and kwami (like sidekicks) speak with a relatively high valence to everybody except to villains, which is expected for there roles.</a:t>
-            </a:r>
-          </a:p>
-          <a:p>
-            <a:pPr>
-              <a:spcAft>
-                <a:spcPts val="3600"/>
-              </a:spcAft>
-            </a:pPr>
-            <a:r>
-              <a:rPr lang="en-US" sz="1200" dirty="0">
-                <a:latin typeface="Franklin Gothic Book" panose="020B0503020102020204" pitchFamily="34" charset="0"/>
-              </a:rPr>
-              <a:t>In Table 3 one can see the general sentiment score of spoken and received messages. Contrary to what was expected in H3, the main characters do not receive more stress and return less negative statements, but the other way around they receive more positive statements.</a:t>
-            </a:r>
-            <a:endParaRPr lang="en-GB" sz="1200" dirty="0">
-              <a:latin typeface="Franklin Gothic Book" panose="020B0503020102020204" pitchFamily="34" charset="0"/>
-            </a:endParaRPr>
-          </a:p>
-          <a:p>
-            <a:r>
-              <a:rPr lang="de-DE" dirty="0"/>
-              <a:t>Takeaway </a:t>
-            </a:r>
-            <a:r>
-              <a:rPr lang="de-DE" dirty="0" err="1"/>
-              <a:t>messae</a:t>
-            </a:r>
-            <a:r>
-              <a:rPr lang="de-DE" dirty="0"/>
-              <a:t>: </a:t>
-            </a:r>
-            <a:r>
-              <a:rPr lang="de-DE" dirty="0" err="1"/>
-              <a:t>metode</a:t>
-            </a:r>
-            <a:r>
-              <a:rPr lang="de-DE" dirty="0"/>
-              <a:t> anwendbar, </a:t>
-            </a:r>
-            <a:r>
-              <a:rPr lang="de-DE" dirty="0" err="1"/>
-              <a:t>quality</a:t>
-            </a:r>
-            <a:r>
-              <a:rPr lang="de-DE" dirty="0"/>
-              <a:t> </a:t>
-            </a:r>
-            <a:r>
-              <a:rPr lang="de-DE" dirty="0" err="1"/>
-              <a:t>of</a:t>
-            </a:r>
-            <a:r>
-              <a:rPr lang="de-DE" dirty="0"/>
-              <a:t> </a:t>
-            </a:r>
-            <a:r>
-              <a:rPr lang="de-DE" dirty="0" err="1"/>
-              <a:t>raw</a:t>
-            </a:r>
-            <a:r>
-              <a:rPr lang="de-DE" dirty="0"/>
-              <a:t> </a:t>
-            </a:r>
-            <a:r>
-              <a:rPr lang="de-DE" dirty="0" err="1"/>
-              <a:t>data</a:t>
-            </a:r>
-            <a:r>
-              <a:rPr lang="de-DE" dirty="0"/>
-              <a:t> </a:t>
-            </a:r>
-            <a:r>
-              <a:rPr lang="de-DE" dirty="0" err="1"/>
-              <a:t>very</a:t>
-            </a:r>
-            <a:r>
-              <a:rPr lang="de-DE" dirty="0"/>
-              <a:t> </a:t>
-            </a:r>
-            <a:r>
-              <a:rPr lang="de-DE" dirty="0" err="1"/>
-              <a:t>important</a:t>
-            </a:r>
-            <a:r>
-              <a:rPr lang="de-DE" dirty="0"/>
-              <a:t>, </a:t>
-            </a:r>
-            <a:r>
-              <a:rPr lang="de-DE" dirty="0" err="1"/>
-              <a:t>verleic</a:t>
-            </a:r>
-            <a:r>
-              <a:rPr lang="de-DE" dirty="0"/>
-              <a:t> andere </a:t>
-            </a:r>
-            <a:r>
-              <a:rPr lang="de-DE" dirty="0" err="1"/>
-              <a:t>serie</a:t>
-            </a:r>
-            <a:r>
-              <a:rPr lang="de-DE" dirty="0"/>
-              <a:t>, </a:t>
-            </a:r>
-            <a:r>
-              <a:rPr lang="de-DE" dirty="0" err="1"/>
-              <a:t>anwendunsbereic</a:t>
-            </a:r>
-            <a:r>
-              <a:rPr lang="de-DE" dirty="0"/>
-              <a:t> </a:t>
-            </a:r>
-            <a:r>
-              <a:rPr lang="de-DE" dirty="0" err="1"/>
-              <a:t>reference</a:t>
-            </a:r>
-            <a:r>
-              <a:rPr lang="de-DE" dirty="0"/>
-              <a:t> </a:t>
-            </a:r>
-            <a:r>
-              <a:rPr lang="de-DE" dirty="0" err="1"/>
-              <a:t>scriftsteller</a:t>
-            </a:r>
-            <a:r>
-              <a:rPr lang="de-DE" dirty="0"/>
-              <a:t>,</a:t>
-            </a:r>
-          </a:p>
-          <a:p>
-            <a:r>
-              <a:rPr lang="de-DE" dirty="0"/>
-              <a:t>R </a:t>
-            </a:r>
-            <a:r>
-              <a:rPr lang="de-DE" dirty="0" err="1"/>
-              <a:t>packaes</a:t>
-            </a:r>
-            <a:r>
-              <a:rPr lang="de-DE" dirty="0"/>
-              <a:t> </a:t>
-            </a:r>
-            <a:r>
-              <a:rPr lang="de-DE" dirty="0" err="1"/>
-              <a:t>referencesn</a:t>
-            </a:r>
             <a:endParaRPr lang="de-DE" dirty="0"/>
           </a:p>
         </p:txBody>
@@ -2271,7 +1741,7 @@
                 <a:ea typeface="District Pro Thin" charset="0"/>
                 <a:cs typeface="District Pro Thin" charset="0"/>
               </a:rPr>
-              <a:t>While in the past the amount of time children could spend watching TV was limited by the number and availability of potential series, nowadays there are hardly any limits, leading to a significant increase of screen time [1]. According to social learning theory, children observe role models in their environment and adopt the behavior practiced [2]. Since models can also be fictional characters like TV characters, the interest in how the characters in these series interact with each other grows, as this behavior is imitated [3]. </a:t>
+              <a:t>While in the past the amount of time children could spend watching TV was limited by the number and availability of potential series, nowadays there are hardly any limits, leading to a significant increase of screen time [1]. According to social learning theory, children observe role models in their environment and adopt the behavior practiced [2]. Since models can also be fictional like e.g. TV characters, the interaction of characters in these series is interesting since this behavior is imitated [3]. </a:t>
             </a:r>
           </a:p>
           <a:p>
@@ -2286,7 +1756,7 @@
                 <a:ea typeface="District Pro Thin" charset="0"/>
                 <a:cs typeface="District Pro Thin" charset="0"/>
               </a:rPr>
-              <a:t>Due to the large amount of data that series bring with them, the goal of this work was to find a computational method to model the social networks in children's series through the verbalization of the characters. Emphasis is placed on the mapping from sender to receiver and the emotional content of the communication.</a:t>
+              <a:t>When analyzing those series a large amount of data must be screened, therefore the goal of this work was to find a computational method to model the social networks in children's series through the verbalization of the characters. Emphasis is placed on the mapping from sender to receiver and the emotional content of the communication.</a:t>
             </a:r>
           </a:p>
           <a:p>
@@ -2326,8 +1796,8 @@
         </p:nvSpPr>
         <p:spPr>
           <a:xfrm>
-            <a:off x="18009406" y="25111544"/>
-            <a:ext cx="11799884" cy="14841018"/>
+            <a:off x="18009406" y="24944645"/>
+            <a:ext cx="11799884" cy="15007918"/>
           </a:xfrm>
           <a:prstGeom prst="rect">
             <a:avLst/>
@@ -2370,7 +1840,7 @@
               <a:rPr lang="en-US" sz="3600" dirty="0">
                 <a:latin typeface="Franklin Gothic Book" panose="020B0503020102020204" pitchFamily="34" charset="0"/>
               </a:rPr>
-              <a:t>Through network analysis, it was possible to map the social structure at the episode, season, and series levels. Table 1 shows the different node characteristics of the characters over the entire series. For the selection of the main characters the betweenness was chosen, meaning how often the person was part of the shortest path. Alternatively, the eigen centrality, which assigns a weight to each edge depending on its influence, could also be used as a criteria for the selection of the main characters.</a:t>
+              <a:t>Through network analysis, it was possible to map the social structure at episode, season, and series level. Table 1 shows the different node characteristics of the characters over the entire series. The main characters were identified by the highest betweenness, meaning how often the person was part of the shortest path. Alternatively, the eigen centrality, which assigns a weight to each edge depending on its influence, could also be used as a criterion for the selection of the main characters, but this leads only to slightly different results.</a:t>
             </a:r>
           </a:p>
           <a:p>
@@ -2383,7 +1853,7 @@
               <a:rPr lang="en-US" sz="3600" dirty="0">
                 <a:latin typeface="Franklin Gothic Book" panose="020B0503020102020204" pitchFamily="34" charset="0"/>
               </a:rPr>
-              <a:t>By means of the sentiment analysis in combination with the network analysis, it was possible to determine both the received and emitted sentiment values per person, per role and in the interaction. Figure 2 shows the interaction with Sentiment between the different roles. It was found that Heroes talk to villains with a significantly more negative sentiment than when villains talk to Heroes (see Table 3).</a:t>
+              <a:t>By means of the sentiment analysis in combination with the network analysis, it was possible to determine both the received and emitted sentiment values per person, per role and in the interaction. Figure 2 shows the interaction between the different roles together with sentiment. It was found that heroes talk to villains with a significantly more negative sentiment than when villains talk to heroes (see Table 3).</a:t>
             </a:r>
           </a:p>
           <a:p>
@@ -2402,7 +1872,7 @@
               <a:rPr lang="en-US" sz="3600" dirty="0">
                 <a:latin typeface="Franklin Gothic Book" panose="020B0503020102020204" pitchFamily="34" charset="0"/>
               </a:rPr>
-              <a:t>: The method described is applicable for the analysis of social network structures and the interaction between characters and roles in children's series. For a scaling with several series the quality of the transcripts must be ensured.</a:t>
+              <a:t>: The method described is applicable for the analysis of social network structures and the interaction between characters and roles exemplified by children's series. For application to several series the quality of the transcripts must be ensured.</a:t>
             </a:r>
             <a:endParaRPr lang="en-GB" sz="3600" dirty="0">
               <a:latin typeface="Franklin Gothic Book" panose="020B0503020102020204" pitchFamily="34" charset="0"/>
@@ -2418,8 +1888,8 @@
         </p:nvSpPr>
         <p:spPr>
           <a:xfrm>
-            <a:off x="587986" y="14969685"/>
-            <a:ext cx="13939378" cy="9952695"/>
+            <a:off x="640631" y="15021977"/>
+            <a:ext cx="14648582" cy="9726933"/>
           </a:xfrm>
           <a:prstGeom prst="rect">
             <a:avLst/>
@@ -2462,7 +1932,7 @@
               <a:rPr lang="en-US" sz="3600" dirty="0">
                 <a:latin typeface="Franklin Gothic Book" panose="020B0503020102020204" pitchFamily="34" charset="0"/>
               </a:rPr>
-              <a:t>The children's series "Miraculous: Tales of Ladybug &amp; Cat Noir" was selected as a proof-of-principle. Using R, the fan-made scripts were fetched from the internet. After cleaning, 131 transcripts of episodes from four seasons containing in total 687 unique speakers (nodes) remained. Metadata such as the assignment of episodes to seasons was also retrieved from Wikipedia using web scrapping and matched with the transcripts.</a:t>
+              <a:t>The children's series "Miraculous: Tales of Ladybug &amp; Cat Noir" was selected as a proof-of-principle. Using the statistical language R, the fan-made scripts were fetched from the internet. Four seasons were analyzed further and after cleansing, 131 transcripts of episodes containing in total 687 unique speakers remained. Metadata such as the assignment of episodes to seasons was also retrieved from Wikipedia. This was done using web scrapping and was matched with the transcripts.</a:t>
             </a:r>
           </a:p>
           <a:p>
@@ -2475,7 +1945,7 @@
               <a:rPr lang="en-US" sz="3600" dirty="0">
                 <a:latin typeface="Franklin Gothic Book" panose="020B0503020102020204" pitchFamily="34" charset="0"/>
               </a:rPr>
-              <a:t>The communication was defined as always addressing the person speaking next, forming the edges. For the calculation of the sentiment in the verbalizations of the characters the deep-learning R packages sentiment.ai [4] was used, for network analysis, </a:t>
+              <a:t>As the central model communication graphs were constructed: the nodes in those graphs are the speakers, edges were defined by the temporal relation from one person to the person speaking next. This model was analyzed using existing R packages: for the calculation of the sentiment in the verbalizations of the characters the deep-learning package sentiment.ai [4] was used, for network analysis, </a:t>
             </a:r>
             <a:r>
               <a:rPr lang="en-US" sz="3600" dirty="0" err="1">
@@ -2489,29 +1959,6 @@
               </a:rPr>
               <a:t> [5].</a:t>
             </a:r>
-          </a:p>
-          <a:p>
-            <a:pPr algn="just">
-              <a:spcAft>
-                <a:spcPts val="3600"/>
-              </a:spcAft>
-            </a:pPr>
-            <a:r>
-              <a:rPr lang="en-US" sz="3600" dirty="0">
-                <a:latin typeface="Franklin Gothic Book" panose="020B0503020102020204" pitchFamily="34" charset="0"/>
-              </a:rPr>
-              <a:t>The five characters with the highest betweenness were chosen as main characters, with one person falling into the villain category, and four main characters.</a:t>
-            </a:r>
-          </a:p>
-          <a:p>
-            <a:pPr algn="just">
-              <a:spcAft>
-                <a:spcPts val="3600"/>
-              </a:spcAft>
-            </a:pPr>
-            <a:endParaRPr lang="de-AT" sz="3600" dirty="0">
-              <a:latin typeface="Franklin Gothic Book" panose="020B0503020102020204" pitchFamily="34" charset="0"/>
-            </a:endParaRPr>
           </a:p>
         </p:txBody>
       </p:sp>
@@ -2791,8 +2238,8 @@
         </p:nvSpPr>
         <p:spPr>
           <a:xfrm>
-            <a:off x="610198" y="25111544"/>
-            <a:ext cx="17132311" cy="14841019"/>
+            <a:off x="610198" y="24987223"/>
+            <a:ext cx="17132311" cy="14965341"/>
           </a:xfrm>
           <a:prstGeom prst="rect">
             <a:avLst/>
@@ -2842,8 +2289,8 @@
         </p:nvGrpSpPr>
         <p:grpSpPr>
           <a:xfrm>
-            <a:off x="14762537" y="14969684"/>
-            <a:ext cx="14924689" cy="9951561"/>
+            <a:off x="15608300" y="15093828"/>
+            <a:ext cx="14093213" cy="9612504"/>
             <a:chOff x="13848613" y="14817333"/>
             <a:chExt cx="15680834" cy="9475638"/>
           </a:xfrm>
@@ -2917,7 +2364,25 @@
                   </a:solidFill>
                   <a:latin typeface="Franklin Gothic Book" panose="020B0503020102020204" pitchFamily="34" charset="0"/>
                 </a:rPr>
-                <a:t> Research </a:t>
+                <a:t>Research </a:t>
+              </a:r>
+              <a:r>
+                <a:rPr lang="de-DE" sz="3600">
+                  <a:solidFill>
+                    <a:schemeClr val="bg1"/>
+                  </a:solidFill>
+                  <a:latin typeface="Franklin Gothic Book" panose="020B0503020102020204" pitchFamily="34" charset="0"/>
+                </a:rPr>
+                <a:t>process</a:t>
+              </a:r>
+              <a:r>
+                <a:rPr lang="de-DE" sz="3600" dirty="0">
+                  <a:solidFill>
+                    <a:schemeClr val="bg1"/>
+                  </a:solidFill>
+                  <a:latin typeface="Franklin Gothic Book" panose="020B0503020102020204" pitchFamily="34" charset="0"/>
+                </a:rPr>
+                <a:t> </a:t>
               </a:r>
               <a:r>
                 <a:rPr lang="de-DE" sz="3600" dirty="0" err="1">
@@ -2927,6 +2392,15 @@
                   <a:latin typeface="Franklin Gothic Book" panose="020B0503020102020204" pitchFamily="34" charset="0"/>
                 </a:rPr>
                 <a:t>workflow</a:t>
+              </a:r>
+              <a:r>
+                <a:rPr lang="de-DE" sz="3600" dirty="0">
+                  <a:solidFill>
+                    <a:schemeClr val="bg1"/>
+                  </a:solidFill>
+                  <a:latin typeface="Franklin Gothic Book" panose="020B0503020102020204" pitchFamily="34" charset="0"/>
+                </a:rPr>
+                <a:t> </a:t>
               </a:r>
               <a:endParaRPr lang="en-US" sz="3600" dirty="0">
                 <a:solidFill>

</xml_diff>